<commit_message>
Added Goals Sequence Diagram in Developer Guide, Updated all images for command classes, Updated DG
</commit_message>
<xml_diff>
--- a/docs/diagrams/LogicCommandBankPackage.pptx
+++ b/docs/diagrams/LogicCommandBankPackage.pptx
@@ -261,7 +261,7 @@
           <a:p>
             <a:fld id="{E1F5E2C2-3E2F-E344-A488-DA00C8D23224}" type="datetimeFigureOut">
               <a:rPr lang="en-US" smtClean="0"/>
-              <a:t>11/8/19</a:t>
+              <a:t>11/9/19</a:t>
             </a:fld>
             <a:endParaRPr lang="en-US"/>
           </a:p>
@@ -461,7 +461,7 @@
           <a:p>
             <a:fld id="{E1F5E2C2-3E2F-E344-A488-DA00C8D23224}" type="datetimeFigureOut">
               <a:rPr lang="en-US" smtClean="0"/>
-              <a:t>11/8/19</a:t>
+              <a:t>11/9/19</a:t>
             </a:fld>
             <a:endParaRPr lang="en-US"/>
           </a:p>
@@ -671,7 +671,7 @@
           <a:p>
             <a:fld id="{E1F5E2C2-3E2F-E344-A488-DA00C8D23224}" type="datetimeFigureOut">
               <a:rPr lang="en-US" smtClean="0"/>
-              <a:t>11/8/19</a:t>
+              <a:t>11/9/19</a:t>
             </a:fld>
             <a:endParaRPr lang="en-US"/>
           </a:p>
@@ -871,7 +871,7 @@
           <a:p>
             <a:fld id="{E1F5E2C2-3E2F-E344-A488-DA00C8D23224}" type="datetimeFigureOut">
               <a:rPr lang="en-US" smtClean="0"/>
-              <a:t>11/8/19</a:t>
+              <a:t>11/9/19</a:t>
             </a:fld>
             <a:endParaRPr lang="en-US"/>
           </a:p>
@@ -1147,7 +1147,7 @@
           <a:p>
             <a:fld id="{E1F5E2C2-3E2F-E344-A488-DA00C8D23224}" type="datetimeFigureOut">
               <a:rPr lang="en-US" smtClean="0"/>
-              <a:t>11/8/19</a:t>
+              <a:t>11/9/19</a:t>
             </a:fld>
             <a:endParaRPr lang="en-US"/>
           </a:p>
@@ -1415,7 +1415,7 @@
           <a:p>
             <a:fld id="{E1F5E2C2-3E2F-E344-A488-DA00C8D23224}" type="datetimeFigureOut">
               <a:rPr lang="en-US" smtClean="0"/>
-              <a:t>11/8/19</a:t>
+              <a:t>11/9/19</a:t>
             </a:fld>
             <a:endParaRPr lang="en-US"/>
           </a:p>
@@ -1830,7 +1830,7 @@
           <a:p>
             <a:fld id="{E1F5E2C2-3E2F-E344-A488-DA00C8D23224}" type="datetimeFigureOut">
               <a:rPr lang="en-US" smtClean="0"/>
-              <a:t>11/8/19</a:t>
+              <a:t>11/9/19</a:t>
             </a:fld>
             <a:endParaRPr lang="en-US"/>
           </a:p>
@@ -1972,7 +1972,7 @@
           <a:p>
             <a:fld id="{E1F5E2C2-3E2F-E344-A488-DA00C8D23224}" type="datetimeFigureOut">
               <a:rPr lang="en-US" smtClean="0"/>
-              <a:t>11/8/19</a:t>
+              <a:t>11/9/19</a:t>
             </a:fld>
             <a:endParaRPr lang="en-US"/>
           </a:p>
@@ -2085,7 +2085,7 @@
           <a:p>
             <a:fld id="{E1F5E2C2-3E2F-E344-A488-DA00C8D23224}" type="datetimeFigureOut">
               <a:rPr lang="en-US" smtClean="0"/>
-              <a:t>11/8/19</a:t>
+              <a:t>11/9/19</a:t>
             </a:fld>
             <a:endParaRPr lang="en-US"/>
           </a:p>
@@ -2398,7 +2398,7 @@
           <a:p>
             <a:fld id="{E1F5E2C2-3E2F-E344-A488-DA00C8D23224}" type="datetimeFigureOut">
               <a:rPr lang="en-US" smtClean="0"/>
-              <a:t>11/8/19</a:t>
+              <a:t>11/9/19</a:t>
             </a:fld>
             <a:endParaRPr lang="en-US"/>
           </a:p>
@@ -2687,7 +2687,7 @@
           <a:p>
             <a:fld id="{E1F5E2C2-3E2F-E344-A488-DA00C8D23224}" type="datetimeFigureOut">
               <a:rPr lang="en-US" smtClean="0"/>
-              <a:t>11/8/19</a:t>
+              <a:t>11/9/19</a:t>
             </a:fld>
             <a:endParaRPr lang="en-US"/>
           </a:p>
@@ -2930,7 +2930,7 @@
           <a:p>
             <a:fld id="{E1F5E2C2-3E2F-E344-A488-DA00C8D23224}" type="datetimeFigureOut">
               <a:rPr lang="en-US" smtClean="0"/>
-              <a:t>11/8/19</a:t>
+              <a:t>11/9/19</a:t>
             </a:fld>
             <a:endParaRPr lang="en-US"/>
           </a:p>
@@ -5301,7 +5301,7 @@
           <p:spPr>
             <a:xfrm>
               <a:off x="1308310" y="1819125"/>
-              <a:ext cx="1487715" cy="369332"/>
+              <a:ext cx="3175678" cy="369332"/>
             </a:xfrm>
             <a:prstGeom prst="rect">
               <a:avLst/>
@@ -5315,7 +5315,7 @@
             <a:p>
               <a:r>
                 <a:rPr lang="en-US" b="1" dirty="0"/>
-                <a:t>Bank Package</a:t>
+                <a:t>Logic, Command, Bank Package</a:t>
               </a:r>
               <a:endParaRPr lang="en-US" dirty="0"/>
             </a:p>

</xml_diff>